<commit_message>
tests and snaps and tests RMSE bug
</commit_message>
<xml_diff>
--- a/tests/testthat/known_output/output-file.pptx
+++ b/tests/testthat/known_output/output-file.pptx
@@ -4,7 +4,7 @@
   <p:sldMasterIdLst>
     <p:sldMasterId id="2147483648" r:id="rId1"/>
   </p:sldMasterIdLst>
-  <p:sldIdLst xmlns:a="http://schemas.openxmlformats.org/drawingml/2006/main" xmlns:r="http://schemas.openxmlformats.org/officeDocument/2006/relationships" xmlns:p="http://schemas.openxmlformats.org/presentationml/2006/main">
+  <p:sldIdLst>
     <p:sldId id="256" r:id="rId8"/>
   </p:sldIdLst>
   <p:sldSz cx="9144000" cy="6858000" type="screen4x3"/>
@@ -2214,7 +2214,7 @@
           <a:chExt cx="0" cy="0"/>
         </a:xfrm>
       </p:grpSpPr>
-      <p:graphicFrame xmlns:a="http://schemas.openxmlformats.org/drawingml/2006/main" xmlns:r="http://schemas.openxmlformats.org/officeDocument/2006/relationships" xmlns:p="http://schemas.openxmlformats.org/presentationml/2006/main">
+      <p:graphicFrame>
         <p:nvGraphicFramePr>
           <p:cNvPr id="2" name="Content Placeholder 2"/>
           <p:cNvGraphicFramePr>
@@ -4737,212 +4737,6 @@
                           <a:ea typeface="DejaVu Sans"/>
                           <a:sym typeface="DejaVu Sans"/>
                         </a:rPr>
-                        <a:t>Log.Lik.</a:t>
-                      </a:r>
-                    </a:p>
-                  </a:txBody>
-                  <a:tcPr anchor="ctr" marB="0" marT="0" marR="0" marL="0">
-                    <a:lnL w="0" cmpd="sng" algn="ctr" cap="flat">
-                      <a:solidFill>
-                        <a:srgbClr val="FFFFFF">
-                          <a:alpha val="0"/>
-                        </a:srgbClr>
-                      </a:solidFill>
-                      <a:prstDash val="solid"/>
-                    </a:lnL>
-                    <a:lnR w="0" cmpd="sng" algn="ctr" cap="flat">
-                      <a:solidFill>
-                        <a:srgbClr val="FFFFFF">
-                          <a:alpha val="0"/>
-                        </a:srgbClr>
-                      </a:solidFill>
-                      <a:prstDash val="solid"/>
-                    </a:lnR>
-                    <a:lnT w="0" cmpd="sng" algn="ctr" cap="flat">
-                      <a:solidFill>
-                        <a:srgbClr val="FFFFFF">
-                          <a:alpha val="0"/>
-                        </a:srgbClr>
-                      </a:solidFill>
-                      <a:prstDash val="solid"/>
-                    </a:lnT>
-                    <a:lnB w="0" cmpd="sng" algn="ctr" cap="flat">
-                      <a:solidFill>
-                        <a:srgbClr val="FFFFFF">
-                          <a:alpha val="0"/>
-                        </a:srgbClr>
-                      </a:solidFill>
-                      <a:prstDash val="solid"/>
-                    </a:lnB>
-                  </a:tcPr>
-                </a:tc>
-                <a:tc>
-                  <a:txBody>
-                    <a:bodyPr/>
-                    <a:lstStyle/>
-                    <a:p>
-                      <a:pPr algn="l" marL="63500" marR="63500">
-                        <a:lnSpc>
-                          <a:spcPct val="100000"/>
-                        </a:lnSpc>
-                        <a:spcBef>
-                          <a:spcPts val="500"/>
-                        </a:spcBef>
-                        <a:spcAft>
-                          <a:spcPts val="500"/>
-                        </a:spcAft>
-                        <a:buNone/>
-                      </a:pPr>
-                      <a:r>
-                        <a:rPr sz="1100">
-                          <a:solidFill>
-                            <a:srgbClr val="000000">
-                              <a:alpha val="100000"/>
-                            </a:srgbClr>
-                          </a:solidFill>
-                          <a:latin typeface="DejaVu Sans"/>
-                          <a:cs typeface="DejaVu Sans"/>
-                          <a:ea typeface="DejaVu Sans"/>
-                          <a:sym typeface="DejaVu Sans"/>
-                        </a:rPr>
-                        <a:t>-165.428</a:t>
-                      </a:r>
-                    </a:p>
-                  </a:txBody>
-                  <a:tcPr anchor="ctr" marB="0" marT="0" marR="0" marL="0">
-                    <a:lnL w="0" cmpd="sng" algn="ctr" cap="flat">
-                      <a:solidFill>
-                        <a:srgbClr val="FFFFFF">
-                          <a:alpha val="0"/>
-                        </a:srgbClr>
-                      </a:solidFill>
-                      <a:prstDash val="solid"/>
-                    </a:lnL>
-                    <a:lnR w="0" cmpd="sng" algn="ctr" cap="flat">
-                      <a:solidFill>
-                        <a:srgbClr val="FFFFFF">
-                          <a:alpha val="0"/>
-                        </a:srgbClr>
-                      </a:solidFill>
-                      <a:prstDash val="solid"/>
-                    </a:lnR>
-                    <a:lnT w="0" cmpd="sng" algn="ctr" cap="flat">
-                      <a:solidFill>
-                        <a:srgbClr val="FFFFFF">
-                          <a:alpha val="0"/>
-                        </a:srgbClr>
-                      </a:solidFill>
-                      <a:prstDash val="solid"/>
-                    </a:lnT>
-                    <a:lnB w="0" cmpd="sng" algn="ctr" cap="flat">
-                      <a:solidFill>
-                        <a:srgbClr val="FFFFFF">
-                          <a:alpha val="0"/>
-                        </a:srgbClr>
-                      </a:solidFill>
-                      <a:prstDash val="solid"/>
-                    </a:lnB>
-                  </a:tcPr>
-                </a:tc>
-                <a:tc>
-                  <a:txBody>
-                    <a:bodyPr/>
-                    <a:lstStyle/>
-                    <a:p>
-                      <a:pPr algn="l" marL="63500" marR="63500">
-                        <a:lnSpc>
-                          <a:spcPct val="100000"/>
-                        </a:lnSpc>
-                        <a:spcBef>
-                          <a:spcPts val="500"/>
-                        </a:spcBef>
-                        <a:spcAft>
-                          <a:spcPts val="500"/>
-                        </a:spcAft>
-                        <a:buNone/>
-                      </a:pPr>
-                      <a:r>
-                        <a:rPr sz="1100">
-                          <a:solidFill>
-                            <a:srgbClr val="000000">
-                              <a:alpha val="100000"/>
-                            </a:srgbClr>
-                          </a:solidFill>
-                          <a:latin typeface="DejaVu Sans"/>
-                          <a:cs typeface="DejaVu Sans"/>
-                          <a:ea typeface="DejaVu Sans"/>
-                          <a:sym typeface="DejaVu Sans"/>
-                        </a:rPr>
-                        <a:t>-164.940</a:t>
-                      </a:r>
-                    </a:p>
-                  </a:txBody>
-                  <a:tcPr anchor="ctr" marB="0" marT="0" marR="0" marL="0">
-                    <a:lnL w="0" cmpd="sng" algn="ctr" cap="flat">
-                      <a:solidFill>
-                        <a:srgbClr val="FFFFFF">
-                          <a:alpha val="0"/>
-                        </a:srgbClr>
-                      </a:solidFill>
-                      <a:prstDash val="solid"/>
-                    </a:lnL>
-                    <a:lnR w="0" cmpd="sng" algn="ctr" cap="flat">
-                      <a:solidFill>
-                        <a:srgbClr val="FFFFFF">
-                          <a:alpha val="0"/>
-                        </a:srgbClr>
-                      </a:solidFill>
-                      <a:prstDash val="solid"/>
-                    </a:lnR>
-                    <a:lnT w="0" cmpd="sng" algn="ctr" cap="flat">
-                      <a:solidFill>
-                        <a:srgbClr val="FFFFFF">
-                          <a:alpha val="0"/>
-                        </a:srgbClr>
-                      </a:solidFill>
-                      <a:prstDash val="solid"/>
-                    </a:lnT>
-                    <a:lnB w="0" cmpd="sng" algn="ctr" cap="flat">
-                      <a:solidFill>
-                        <a:srgbClr val="FFFFFF">
-                          <a:alpha val="0"/>
-                        </a:srgbClr>
-                      </a:solidFill>
-                      <a:prstDash val="solid"/>
-                    </a:lnB>
-                  </a:tcPr>
-                </a:tc>
-              </a:tr>
-              <a:tr h="228600">
-                <a:tc>
-                  <a:txBody>
-                    <a:bodyPr/>
-                    <a:lstStyle/>
-                    <a:p>
-                      <a:pPr algn="l" marL="63500" marR="63500">
-                        <a:lnSpc>
-                          <a:spcPct val="100000"/>
-                        </a:lnSpc>
-                        <a:spcBef>
-                          <a:spcPts val="500"/>
-                        </a:spcBef>
-                        <a:spcAft>
-                          <a:spcPts val="500"/>
-                        </a:spcAft>
-                        <a:buNone/>
-                      </a:pPr>
-                      <a:r>
-                        <a:rPr sz="1100">
-                          <a:solidFill>
-                            <a:srgbClr val="000000">
-                              <a:alpha val="100000"/>
-                            </a:srgbClr>
-                          </a:solidFill>
-                          <a:latin typeface="DejaVu Sans"/>
-                          <a:cs typeface="DejaVu Sans"/>
-                          <a:ea typeface="DejaVu Sans"/>
-                          <a:sym typeface="DejaVu Sans"/>
-                        </a:rPr>
                         <a:t>F</a:t>
                       </a:r>
                     </a:p>
@@ -4972,10 +4766,10 @@
                       </a:solidFill>
                       <a:prstDash val="solid"/>
                     </a:lnT>
-                    <a:lnB w="25400" cmpd="sng" algn="ctr" cap="flat">
-                      <a:solidFill>
-                        <a:srgbClr val="666666">
-                          <a:alpha val="100000"/>
+                    <a:lnB w="0" cmpd="sng" algn="ctr" cap="flat">
+                      <a:solidFill>
+                        <a:srgbClr val="FFFFFF">
+                          <a:alpha val="0"/>
                         </a:srgbClr>
                       </a:solidFill>
                       <a:prstDash val="solid"/>
@@ -5040,10 +4834,10 @@
                       </a:solidFill>
                       <a:prstDash val="solid"/>
                     </a:lnT>
-                    <a:lnB w="25400" cmpd="sng" algn="ctr" cap="flat">
-                      <a:solidFill>
-                        <a:srgbClr val="666666">
-                          <a:alpha val="100000"/>
+                    <a:lnB w="0" cmpd="sng" algn="ctr" cap="flat">
+                      <a:solidFill>
+                        <a:srgbClr val="FFFFFF">
+                          <a:alpha val="0"/>
                         </a:srgbClr>
                       </a:solidFill>
                       <a:prstDash val="solid"/>
@@ -5080,6 +4874,212 @@
                           <a:sym typeface="DejaVu Sans"/>
                         </a:rPr>
                         <a:t>23.100</a:t>
+                      </a:r>
+                    </a:p>
+                  </a:txBody>
+                  <a:tcPr anchor="ctr" marB="0" marT="0" marR="0" marL="0">
+                    <a:lnL w="0" cmpd="sng" algn="ctr" cap="flat">
+                      <a:solidFill>
+                        <a:srgbClr val="FFFFFF">
+                          <a:alpha val="0"/>
+                        </a:srgbClr>
+                      </a:solidFill>
+                      <a:prstDash val="solid"/>
+                    </a:lnL>
+                    <a:lnR w="0" cmpd="sng" algn="ctr" cap="flat">
+                      <a:solidFill>
+                        <a:srgbClr val="FFFFFF">
+                          <a:alpha val="0"/>
+                        </a:srgbClr>
+                      </a:solidFill>
+                      <a:prstDash val="solid"/>
+                    </a:lnR>
+                    <a:lnT w="0" cmpd="sng" algn="ctr" cap="flat">
+                      <a:solidFill>
+                        <a:srgbClr val="FFFFFF">
+                          <a:alpha val="0"/>
+                        </a:srgbClr>
+                      </a:solidFill>
+                      <a:prstDash val="solid"/>
+                    </a:lnT>
+                    <a:lnB w="0" cmpd="sng" algn="ctr" cap="flat">
+                      <a:solidFill>
+                        <a:srgbClr val="FFFFFF">
+                          <a:alpha val="0"/>
+                        </a:srgbClr>
+                      </a:solidFill>
+                      <a:prstDash val="solid"/>
+                    </a:lnB>
+                  </a:tcPr>
+                </a:tc>
+              </a:tr>
+              <a:tr h="228600">
+                <a:tc>
+                  <a:txBody>
+                    <a:bodyPr/>
+                    <a:lstStyle/>
+                    <a:p>
+                      <a:pPr algn="l" marL="63500" marR="63500">
+                        <a:lnSpc>
+                          <a:spcPct val="100000"/>
+                        </a:lnSpc>
+                        <a:spcBef>
+                          <a:spcPts val="500"/>
+                        </a:spcBef>
+                        <a:spcAft>
+                          <a:spcPts val="500"/>
+                        </a:spcAft>
+                        <a:buNone/>
+                      </a:pPr>
+                      <a:r>
+                        <a:rPr sz="1100">
+                          <a:solidFill>
+                            <a:srgbClr val="000000">
+                              <a:alpha val="100000"/>
+                            </a:srgbClr>
+                          </a:solidFill>
+                          <a:latin typeface="DejaVu Sans"/>
+                          <a:cs typeface="DejaVu Sans"/>
+                          <a:ea typeface="DejaVu Sans"/>
+                          <a:sym typeface="DejaVu Sans"/>
+                        </a:rPr>
+                        <a:t>RMSE</a:t>
+                      </a:r>
+                    </a:p>
+                  </a:txBody>
+                  <a:tcPr anchor="ctr" marB="0" marT="0" marR="0" marL="0">
+                    <a:lnL w="0" cmpd="sng" algn="ctr" cap="flat">
+                      <a:solidFill>
+                        <a:srgbClr val="FFFFFF">
+                          <a:alpha val="0"/>
+                        </a:srgbClr>
+                      </a:solidFill>
+                      <a:prstDash val="solid"/>
+                    </a:lnL>
+                    <a:lnR w="0" cmpd="sng" algn="ctr" cap="flat">
+                      <a:solidFill>
+                        <a:srgbClr val="FFFFFF">
+                          <a:alpha val="0"/>
+                        </a:srgbClr>
+                      </a:solidFill>
+                      <a:prstDash val="solid"/>
+                    </a:lnR>
+                    <a:lnT w="0" cmpd="sng" algn="ctr" cap="flat">
+                      <a:solidFill>
+                        <a:srgbClr val="FFFFFF">
+                          <a:alpha val="0"/>
+                        </a:srgbClr>
+                      </a:solidFill>
+                      <a:prstDash val="solid"/>
+                    </a:lnT>
+                    <a:lnB w="25400" cmpd="sng" algn="ctr" cap="flat">
+                      <a:solidFill>
+                        <a:srgbClr val="666666">
+                          <a:alpha val="100000"/>
+                        </a:srgbClr>
+                      </a:solidFill>
+                      <a:prstDash val="solid"/>
+                    </a:lnB>
+                  </a:tcPr>
+                </a:tc>
+                <a:tc>
+                  <a:txBody>
+                    <a:bodyPr/>
+                    <a:lstStyle/>
+                    <a:p>
+                      <a:pPr algn="l" marL="63500" marR="63500">
+                        <a:lnSpc>
+                          <a:spcPct val="100000"/>
+                        </a:lnSpc>
+                        <a:spcBef>
+                          <a:spcPts val="500"/>
+                        </a:spcBef>
+                        <a:spcAft>
+                          <a:spcPts val="500"/>
+                        </a:spcAft>
+                        <a:buNone/>
+                      </a:pPr>
+                      <a:r>
+                        <a:rPr sz="1100">
+                          <a:solidFill>
+                            <a:srgbClr val="000000">
+                              <a:alpha val="100000"/>
+                            </a:srgbClr>
+                          </a:solidFill>
+                          <a:latin typeface="DejaVu Sans"/>
+                          <a:cs typeface="DejaVu Sans"/>
+                          <a:ea typeface="DejaVu Sans"/>
+                          <a:sym typeface="DejaVu Sans"/>
+                        </a:rPr>
+                        <a:t>42.55</a:t>
+                      </a:r>
+                    </a:p>
+                  </a:txBody>
+                  <a:tcPr anchor="ctr" marB="0" marT="0" marR="0" marL="0">
+                    <a:lnL w="0" cmpd="sng" algn="ctr" cap="flat">
+                      <a:solidFill>
+                        <a:srgbClr val="FFFFFF">
+                          <a:alpha val="0"/>
+                        </a:srgbClr>
+                      </a:solidFill>
+                      <a:prstDash val="solid"/>
+                    </a:lnL>
+                    <a:lnR w="0" cmpd="sng" algn="ctr" cap="flat">
+                      <a:solidFill>
+                        <a:srgbClr val="FFFFFF">
+                          <a:alpha val="0"/>
+                        </a:srgbClr>
+                      </a:solidFill>
+                      <a:prstDash val="solid"/>
+                    </a:lnR>
+                    <a:lnT w="0" cmpd="sng" algn="ctr" cap="flat">
+                      <a:solidFill>
+                        <a:srgbClr val="FFFFFF">
+                          <a:alpha val="0"/>
+                        </a:srgbClr>
+                      </a:solidFill>
+                      <a:prstDash val="solid"/>
+                    </a:lnT>
+                    <a:lnB w="25400" cmpd="sng" algn="ctr" cap="flat">
+                      <a:solidFill>
+                        <a:srgbClr val="666666">
+                          <a:alpha val="100000"/>
+                        </a:srgbClr>
+                      </a:solidFill>
+                      <a:prstDash val="solid"/>
+                    </a:lnB>
+                  </a:tcPr>
+                </a:tc>
+                <a:tc>
+                  <a:txBody>
+                    <a:bodyPr/>
+                    <a:lstStyle/>
+                    <a:p>
+                      <a:pPr algn="l" marL="63500" marR="63500">
+                        <a:lnSpc>
+                          <a:spcPct val="100000"/>
+                        </a:lnSpc>
+                        <a:spcBef>
+                          <a:spcPts val="500"/>
+                        </a:spcBef>
+                        <a:spcAft>
+                          <a:spcPts val="500"/>
+                        </a:spcAft>
+                        <a:buNone/>
+                      </a:pPr>
+                      <a:r>
+                        <a:rPr sz="1100">
+                          <a:solidFill>
+                            <a:srgbClr val="000000">
+                              <a:alpha val="100000"/>
+                            </a:srgbClr>
+                          </a:solidFill>
+                          <a:latin typeface="DejaVu Sans"/>
+                          <a:cs typeface="DejaVu Sans"/>
+                          <a:ea typeface="DejaVu Sans"/>
+                          <a:sym typeface="DejaVu Sans"/>
+                        </a:rPr>
+                        <a:t>41.91</a:t>
                       </a:r>
                     </a:p>
                   </a:txBody>

</xml_diff>